<commit_message>
change plot panels to lowercase
</commit_message>
<xml_diff>
--- a/ConceptualModel/ConceptualModel.pptx
+++ b/ConceptualModel/ConceptualModel.pptx
@@ -199,7 +199,7 @@
           <a:p>
             <a:fld id="{54572566-CCA2-4D4D-A440-3FE10FF47AA2}" type="datetimeFigureOut">
               <a:rPr lang="en-US" smtClean="0"/>
-              <a:t>5/21/2019</a:t>
+              <a:t>6/21/2019</a:t>
             </a:fld>
             <a:endParaRPr lang="en-US"/>
           </a:p>
@@ -598,7 +598,7 @@
           <a:p>
             <a:fld id="{E390F6E8-C144-436A-9D85-3DE21C0B37C4}" type="datetimeFigureOut">
               <a:rPr lang="en-US" smtClean="0"/>
-              <a:t>5/21/2019</a:t>
+              <a:t>6/21/2019</a:t>
             </a:fld>
             <a:endParaRPr lang="en-US"/>
           </a:p>
@@ -768,7 +768,7 @@
           <a:p>
             <a:fld id="{E390F6E8-C144-436A-9D85-3DE21C0B37C4}" type="datetimeFigureOut">
               <a:rPr lang="en-US" smtClean="0"/>
-              <a:t>5/21/2019</a:t>
+              <a:t>6/21/2019</a:t>
             </a:fld>
             <a:endParaRPr lang="en-US"/>
           </a:p>
@@ -948,7 +948,7 @@
           <a:p>
             <a:fld id="{E390F6E8-C144-436A-9D85-3DE21C0B37C4}" type="datetimeFigureOut">
               <a:rPr lang="en-US" smtClean="0"/>
-              <a:t>5/21/2019</a:t>
+              <a:t>6/21/2019</a:t>
             </a:fld>
             <a:endParaRPr lang="en-US"/>
           </a:p>
@@ -1118,7 +1118,7 @@
           <a:p>
             <a:fld id="{E390F6E8-C144-436A-9D85-3DE21C0B37C4}" type="datetimeFigureOut">
               <a:rPr lang="en-US" smtClean="0"/>
-              <a:t>5/21/2019</a:t>
+              <a:t>6/21/2019</a:t>
             </a:fld>
             <a:endParaRPr lang="en-US"/>
           </a:p>
@@ -1362,7 +1362,7 @@
           <a:p>
             <a:fld id="{E390F6E8-C144-436A-9D85-3DE21C0B37C4}" type="datetimeFigureOut">
               <a:rPr lang="en-US" smtClean="0"/>
-              <a:t>5/21/2019</a:t>
+              <a:t>6/21/2019</a:t>
             </a:fld>
             <a:endParaRPr lang="en-US"/>
           </a:p>
@@ -1594,7 +1594,7 @@
           <a:p>
             <a:fld id="{E390F6E8-C144-436A-9D85-3DE21C0B37C4}" type="datetimeFigureOut">
               <a:rPr lang="en-US" smtClean="0"/>
-              <a:t>5/21/2019</a:t>
+              <a:t>6/21/2019</a:t>
             </a:fld>
             <a:endParaRPr lang="en-US"/>
           </a:p>
@@ -1961,7 +1961,7 @@
           <a:p>
             <a:fld id="{E390F6E8-C144-436A-9D85-3DE21C0B37C4}" type="datetimeFigureOut">
               <a:rPr lang="en-US" smtClean="0"/>
-              <a:t>5/21/2019</a:t>
+              <a:t>6/21/2019</a:t>
             </a:fld>
             <a:endParaRPr lang="en-US"/>
           </a:p>
@@ -2079,7 +2079,7 @@
           <a:p>
             <a:fld id="{E390F6E8-C144-436A-9D85-3DE21C0B37C4}" type="datetimeFigureOut">
               <a:rPr lang="en-US" smtClean="0"/>
-              <a:t>5/21/2019</a:t>
+              <a:t>6/21/2019</a:t>
             </a:fld>
             <a:endParaRPr lang="en-US"/>
           </a:p>
@@ -2174,7 +2174,7 @@
           <a:p>
             <a:fld id="{E390F6E8-C144-436A-9D85-3DE21C0B37C4}" type="datetimeFigureOut">
               <a:rPr lang="en-US" smtClean="0"/>
-              <a:t>5/21/2019</a:t>
+              <a:t>6/21/2019</a:t>
             </a:fld>
             <a:endParaRPr lang="en-US"/>
           </a:p>
@@ -2451,7 +2451,7 @@
           <a:p>
             <a:fld id="{E390F6E8-C144-436A-9D85-3DE21C0B37C4}" type="datetimeFigureOut">
               <a:rPr lang="en-US" smtClean="0"/>
-              <a:t>5/21/2019</a:t>
+              <a:t>6/21/2019</a:t>
             </a:fld>
             <a:endParaRPr lang="en-US"/>
           </a:p>
@@ -2708,7 +2708,7 @@
           <a:p>
             <a:fld id="{E390F6E8-C144-436A-9D85-3DE21C0B37C4}" type="datetimeFigureOut">
               <a:rPr lang="en-US" smtClean="0"/>
-              <a:t>5/21/2019</a:t>
+              <a:t>6/21/2019</a:t>
             </a:fld>
             <a:endParaRPr lang="en-US"/>
           </a:p>
@@ -2921,7 +2921,7 @@
           <a:p>
             <a:fld id="{E390F6E8-C144-436A-9D85-3DE21C0B37C4}" type="datetimeFigureOut">
               <a:rPr lang="en-US" smtClean="0"/>
-              <a:t>5/21/2019</a:t>
+              <a:t>6/21/2019</a:t>
             </a:fld>
             <a:endParaRPr lang="en-US"/>
           </a:p>
@@ -34019,10 +34019,6 @@
                 </a:rPr>
                 <a:t>lake</a:t>
               </a:r>
-              <a:endParaRPr lang="en-US" sz="1000" dirty="0" smtClean="0">
-                <a:latin typeface="Arial" panose="020B0604020202020204" pitchFamily="34" charset="0"/>
-                <a:cs typeface="Arial" panose="020B0604020202020204" pitchFamily="34" charset="0"/>
-              </a:endParaRPr>
             </a:p>
             <a:p>
               <a:pPr>
@@ -41045,7 +41041,7 @@
                 <a:latin typeface="Arial" panose="020B0604020202020204" pitchFamily="34" charset="0"/>
                 <a:cs typeface="Arial" panose="020B0604020202020204" pitchFamily="34" charset="0"/>
               </a:rPr>
-              <a:t>C)</a:t>
+              <a:t>c)</a:t>
             </a:r>
             <a:endParaRPr lang="en-US" sz="1100" b="1" dirty="0">
               <a:latin typeface="Arial" panose="020B0604020202020204" pitchFamily="34" charset="0"/>
@@ -41084,18 +41080,11 @@
           <a:lstStyle/>
           <a:p>
             <a:r>
-              <a:rPr lang="en-US" sz="1100" b="1" dirty="0">
-                <a:latin typeface="Arial" panose="020B0604020202020204" pitchFamily="34" charset="0"/>
-                <a:cs typeface="Arial" panose="020B0604020202020204" pitchFamily="34" charset="0"/>
-              </a:rPr>
-              <a:t>A</a:t>
-            </a:r>
-            <a:r>
               <a:rPr lang="en-US" sz="1100" b="1" dirty="0" smtClean="0">
                 <a:latin typeface="Arial" panose="020B0604020202020204" pitchFamily="34" charset="0"/>
                 <a:cs typeface="Arial" panose="020B0604020202020204" pitchFamily="34" charset="0"/>
               </a:rPr>
-              <a:t>)</a:t>
+              <a:t>a)</a:t>
             </a:r>
             <a:endParaRPr lang="en-US" sz="1100" b="1" dirty="0">
               <a:latin typeface="Arial" panose="020B0604020202020204" pitchFamily="34" charset="0"/>
@@ -41134,18 +41123,11 @@
           <a:lstStyle/>
           <a:p>
             <a:r>
-              <a:rPr lang="en-US" sz="1100" b="1" dirty="0">
-                <a:latin typeface="Arial" panose="020B0604020202020204" pitchFamily="34" charset="0"/>
-                <a:cs typeface="Arial" panose="020B0604020202020204" pitchFamily="34" charset="0"/>
-              </a:rPr>
-              <a:t>D</a:t>
-            </a:r>
-            <a:r>
               <a:rPr lang="en-US" sz="1100" b="1" dirty="0" smtClean="0">
                 <a:latin typeface="Arial" panose="020B0604020202020204" pitchFamily="34" charset="0"/>
                 <a:cs typeface="Arial" panose="020B0604020202020204" pitchFamily="34" charset="0"/>
               </a:rPr>
-              <a:t>)</a:t>
+              <a:t>d)</a:t>
             </a:r>
             <a:endParaRPr lang="en-US" sz="1100" b="1" dirty="0">
               <a:latin typeface="Arial" panose="020B0604020202020204" pitchFamily="34" charset="0"/>
@@ -41184,18 +41166,11 @@
           <a:lstStyle/>
           <a:p>
             <a:r>
-              <a:rPr lang="en-US" sz="1100" b="1" dirty="0">
-                <a:latin typeface="Arial" panose="020B0604020202020204" pitchFamily="34" charset="0"/>
-                <a:cs typeface="Arial" panose="020B0604020202020204" pitchFamily="34" charset="0"/>
-              </a:rPr>
-              <a:t>B</a:t>
-            </a:r>
-            <a:r>
               <a:rPr lang="en-US" sz="1100" b="1" dirty="0" smtClean="0">
                 <a:latin typeface="Arial" panose="020B0604020202020204" pitchFamily="34" charset="0"/>
                 <a:cs typeface="Arial" panose="020B0604020202020204" pitchFamily="34" charset="0"/>
               </a:rPr>
-              <a:t>)</a:t>
+              <a:t>b)</a:t>
             </a:r>
             <a:endParaRPr lang="en-US" sz="1100" b="1" dirty="0">
               <a:latin typeface="Arial" panose="020B0604020202020204" pitchFamily="34" charset="0"/>

</xml_diff>